<commit_message>
Updated Backend - Added Flask app skeleton, load symptoms from dataset
</commit_message>
<xml_diff>
--- a/CS_8thSem_80.pptx
+++ b/CS_8thSem_80.pptx
@@ -164,7 +164,7 @@
       </p14:sectionLst>
     </p:ext>
     <p:ext uri="{EFAFB233-063F-42B5-8137-9DF3F51BA10A}">
-      <p15:sldGuideLst xmlns:p15="http://schemas.microsoft.com/office/powerpoint/2012/main" xmlns="">
+      <p15:sldGuideLst xmlns="" xmlns:p15="http://schemas.microsoft.com/office/powerpoint/2012/main">
         <p15:guide id="1" orient="horz" pos="2160">
           <p15:clr>
             <a:srgbClr val="A4A3A4"/>
@@ -263,7 +263,7 @@
           <a:p>
             <a:fld id="{7F5DACC6-2C4A-4A8D-A4F1-8A3FBD3A273D}" type="datetimeFigureOut">
               <a:rPr lang="en-IN" smtClean="0"/>
-              <a:t>13-07-2022</a:t>
+              <a:t>05-05-2025</a:t>
             </a:fld>
             <a:endParaRPr lang="en-IN"/>
           </a:p>
@@ -2344,7 +2344,7 @@
             <a:fld id="{1D8BD707-D9CF-40AE-B4C6-C98DA3205C09}" type="datetimeFigureOut">
               <a:rPr lang="en-US" smtClean="0"/>
               <a:pPr/>
-              <a:t>7/13/2022</a:t>
+              <a:t>5/5/2025</a:t>
             </a:fld>
             <a:endParaRPr lang="en-US"/>
           </a:p>
@@ -2527,7 +2527,7 @@
             <a:fld id="{1D8BD707-D9CF-40AE-B4C6-C98DA3205C09}" type="datetimeFigureOut">
               <a:rPr lang="en-US" smtClean="0"/>
               <a:pPr/>
-              <a:t>7/13/2022</a:t>
+              <a:t>5/5/2025</a:t>
             </a:fld>
             <a:endParaRPr lang="en-US"/>
           </a:p>
@@ -2680,7 +2680,7 @@
             <a:fld id="{1D8BD707-D9CF-40AE-B4C6-C98DA3205C09}" type="datetimeFigureOut">
               <a:rPr lang="en-US" smtClean="0"/>
               <a:pPr/>
-              <a:t>7/13/2022</a:t>
+              <a:t>5/5/2025</a:t>
             </a:fld>
             <a:endParaRPr lang="en-US"/>
           </a:p>
@@ -4508,7 +4508,7 @@
             <a:fld id="{1D8BD707-D9CF-40AE-B4C6-C98DA3205C09}" type="datetimeFigureOut">
               <a:rPr lang="en-US" smtClean="0"/>
               <a:pPr/>
-              <a:t>7/13/2022</a:t>
+              <a:t>5/5/2025</a:t>
             </a:fld>
             <a:endParaRPr lang="en-US"/>
           </a:p>
@@ -6380,7 +6380,7 @@
             <a:fld id="{1D8BD707-D9CF-40AE-B4C6-C98DA3205C09}" type="datetimeFigureOut">
               <a:rPr lang="en-US" smtClean="0"/>
               <a:pPr/>
-              <a:t>7/13/2022</a:t>
+              <a:t>5/5/2025</a:t>
             </a:fld>
             <a:endParaRPr lang="en-US"/>
           </a:p>
@@ -6495,7 +6495,7 @@
             <a:fld id="{1D8BD707-D9CF-40AE-B4C6-C98DA3205C09}" type="datetimeFigureOut">
               <a:rPr lang="en-US" smtClean="0"/>
               <a:pPr/>
-              <a:t>7/13/2022</a:t>
+              <a:t>5/5/2025</a:t>
             </a:fld>
             <a:endParaRPr lang="en-US"/>
           </a:p>
@@ -7038,7 +7038,7 @@
             <a:fld id="{1D8BD707-D9CF-40AE-B4C6-C98DA3205C09}" type="datetimeFigureOut">
               <a:rPr lang="en-US" smtClean="0"/>
               <a:pPr/>
-              <a:t>7/13/2022</a:t>
+              <a:t>5/5/2025</a:t>
             </a:fld>
             <a:endParaRPr lang="en-US"/>
           </a:p>
@@ -7153,7 +7153,7 @@
             <a:fld id="{1D8BD707-D9CF-40AE-B4C6-C98DA3205C09}" type="datetimeFigureOut">
               <a:rPr lang="en-US" smtClean="0"/>
               <a:pPr/>
-              <a:t>7/13/2022</a:t>
+              <a:t>5/5/2025</a:t>
             </a:fld>
             <a:endParaRPr lang="en-US"/>
           </a:p>
@@ -8866,7 +8866,7 @@
             <a:fld id="{1D8BD707-D9CF-40AE-B4C6-C98DA3205C09}" type="datetimeFigureOut">
               <a:rPr lang="en-US" smtClean="0"/>
               <a:pPr/>
-              <a:t>7/13/2022</a:t>
+              <a:t>5/5/2025</a:t>
             </a:fld>
             <a:endParaRPr lang="en-US"/>
           </a:p>
@@ -9019,7 +9019,7 @@
             <a:fld id="{1D8BD707-D9CF-40AE-B4C6-C98DA3205C09}" type="datetimeFigureOut">
               <a:rPr lang="en-US" smtClean="0"/>
               <a:pPr/>
-              <a:t>7/13/2022</a:t>
+              <a:t>5/5/2025</a:t>
             </a:fld>
             <a:endParaRPr lang="en-US"/>
           </a:p>
@@ -12636,7 +12636,7 @@
             <a:fld id="{1D8BD707-D9CF-40AE-B4C6-C98DA3205C09}" type="datetimeFigureOut">
               <a:rPr lang="en-US" smtClean="0"/>
               <a:pPr/>
-              <a:t>7/13/2022</a:t>
+              <a:t>5/5/2025</a:t>
             </a:fld>
             <a:endParaRPr lang="en-US"/>
           </a:p>
@@ -14497,7 +14497,7 @@
             <a:fld id="{1D8BD707-D9CF-40AE-B4C6-C98DA3205C09}" type="datetimeFigureOut">
               <a:rPr lang="en-US" smtClean="0"/>
               <a:pPr/>
-              <a:t>7/13/2022</a:t>
+              <a:t>5/5/2025</a:t>
             </a:fld>
             <a:endParaRPr lang="en-US"/>
           </a:p>
@@ -15256,10 +15256,6 @@
               </a:rPr>
               <a:t> By</a:t>
             </a:r>
-            <a:endParaRPr lang="en-IN" sz="2200" dirty="0" smtClean="0">
-              <a:latin typeface="Times New Roman" pitchFamily="18" charset="0"/>
-              <a:cs typeface="Times New Roman" pitchFamily="18" charset="0"/>
-            </a:endParaRPr>
           </a:p>
           <a:p>
             <a:pPr algn="ctr"/>
@@ -15268,14 +15264,7 @@
                 <a:latin typeface="Times New Roman" pitchFamily="18" charset="0"/>
                 <a:cs typeface="Times New Roman" pitchFamily="18" charset="0"/>
               </a:rPr>
-              <a:t> GROUP </a:t>
-            </a:r>
-            <a:r>
-              <a:rPr lang="en-IN" sz="2400" b="1" dirty="0" smtClean="0">
-                <a:latin typeface="Times New Roman" pitchFamily="18" charset="0"/>
-                <a:cs typeface="Times New Roman" pitchFamily="18" charset="0"/>
-              </a:rPr>
-              <a:t>No. 80</a:t>
+              <a:t> GROUP No. 80</a:t>
             </a:r>
             <a:endParaRPr lang="en-IN" dirty="0">
               <a:latin typeface="Times New Roman" pitchFamily="18" charset="0"/>
@@ -15325,48 +15314,16 @@
                 <a:latin typeface="Times New Roman" pitchFamily="18" charset="0"/>
                 <a:cs typeface="Times New Roman" pitchFamily="18" charset="0"/>
               </a:rPr>
-              <a:t>PAPER </a:t>
-            </a:r>
+              <a:t>PAPER NAME	:      PROJECT - II</a:t>
+            </a:r>
+          </a:p>
+          <a:p>
             <a:r>
               <a:rPr lang="en-IN" sz="2000" dirty="0" smtClean="0">
                 <a:latin typeface="Times New Roman" pitchFamily="18" charset="0"/>
                 <a:cs typeface="Times New Roman" pitchFamily="18" charset="0"/>
               </a:rPr>
-              <a:t>NAME	:      PROJECT </a:t>
-            </a:r>
-            <a:r>
-              <a:rPr lang="en-IN" sz="2000" dirty="0" smtClean="0">
-                <a:latin typeface="Times New Roman" pitchFamily="18" charset="0"/>
-                <a:cs typeface="Times New Roman" pitchFamily="18" charset="0"/>
-              </a:rPr>
-              <a:t>- </a:t>
-            </a:r>
-            <a:r>
-              <a:rPr lang="en-IN" sz="2000" dirty="0" smtClean="0">
-                <a:latin typeface="Times New Roman" pitchFamily="18" charset="0"/>
-                <a:cs typeface="Times New Roman" pitchFamily="18" charset="0"/>
-              </a:rPr>
-              <a:t>II</a:t>
-            </a:r>
-            <a:endParaRPr lang="en-IN" sz="2000" dirty="0" smtClean="0">
-              <a:latin typeface="Times New Roman" pitchFamily="18" charset="0"/>
-              <a:cs typeface="Times New Roman" pitchFamily="18" charset="0"/>
-            </a:endParaRPr>
-          </a:p>
-          <a:p>
-            <a:r>
-              <a:rPr lang="en-IN" sz="2000" dirty="0" smtClean="0">
-                <a:latin typeface="Times New Roman" pitchFamily="18" charset="0"/>
-                <a:cs typeface="Times New Roman" pitchFamily="18" charset="0"/>
-              </a:rPr>
-              <a:t>PAPER </a:t>
-            </a:r>
-            <a:r>
-              <a:rPr lang="en-IN" sz="2000" dirty="0" smtClean="0">
-                <a:latin typeface="Times New Roman" pitchFamily="18" charset="0"/>
-                <a:cs typeface="Times New Roman" pitchFamily="18" charset="0"/>
-              </a:rPr>
-              <a:t>CODE	:      PROJCS801</a:t>
+              <a:t>PAPER CODE	:      PROJCS801</a:t>
             </a:r>
             <a:endParaRPr lang="en-IN" sz="2000" dirty="0">
               <a:latin typeface="Times New Roman" pitchFamily="18" charset="0"/>
@@ -15772,7 +15729,7 @@
         <p:spPr>
           <a:xfrm>
             <a:off x="990600" y="1600200"/>
-            <a:ext cx="7010400" cy="3693319"/>
+            <a:ext cx="7010400" cy="3139321"/>
           </a:xfrm>
           <a:prstGeom prst="rect">
             <a:avLst/>
@@ -15806,50 +15763,35 @@
               <a:t>	</a:t>
             </a:r>
             <a:r>
-              <a:rPr lang="en-IN" dirty="0" err="1" smtClean="0"/>
-              <a:t>HyperText</a:t>
-            </a:r>
-            <a:r>
               <a:rPr lang="en-IN" dirty="0" smtClean="0"/>
-              <a:t> </a:t>
-            </a:r>
-            <a:r>
-              <a:rPr lang="en-IN" dirty="0" err="1"/>
-              <a:t>Markup</a:t>
+              <a:t>HyperText Marku</a:t>
             </a:r>
             <a:r>
               <a:rPr lang="en-IN" dirty="0"/>
-              <a:t> Language (</a:t>
+              <a:t>p</a:t>
             </a:r>
             <a:r>
               <a:rPr lang="en-IN" dirty="0" smtClean="0"/>
-              <a:t>HTML)</a:t>
+              <a:t> Language (HTML)</a:t>
             </a:r>
             <a:br>
               <a:rPr lang="en-IN" dirty="0" smtClean="0"/>
             </a:br>
             <a:r>
+              <a:rPr lang="en-IN" dirty="0"/>
+              <a:t>	Cascading Style Sheets (CSS)</a:t>
+            </a:r>
+            <a:br>
+              <a:rPr lang="en-IN" dirty="0"/>
+            </a:br>
+            <a:r>
               <a:rPr lang="en-IN" dirty="0" smtClean="0"/>
-              <a:t>	Cascading </a:t>
-            </a:r>
-            <a:r>
-              <a:rPr lang="en-IN" dirty="0"/>
-              <a:t>Style Sheets (</a:t>
+              <a:t>	React </a:t>
             </a:r>
             <a:r>
               <a:rPr lang="en-IN" dirty="0" smtClean="0"/>
-              <a:t>CSS)</a:t>
-            </a:r>
-            <a:br>
-              <a:rPr lang="en-IN" dirty="0" smtClean="0"/>
-            </a:br>
-            <a:r>
-              <a:rPr lang="en-IN" dirty="0" smtClean="0"/>
-              <a:t>	JavaScript</a:t>
-            </a:r>
-            <a:br>
-              <a:rPr lang="en-IN" dirty="0" smtClean="0"/>
-            </a:br>
+              <a:t>JS</a:t>
+            </a:r>
             <a:endParaRPr lang="en-IN" dirty="0" smtClean="0"/>
           </a:p>
           <a:p>
@@ -15877,11 +15819,12 @@
             </a:br>
             <a:r>
               <a:rPr lang="en-IN" dirty="0" smtClean="0"/>
-              <a:t>	Python (Framework - FLASK)</a:t>
-            </a:r>
-            <a:br>
+              <a:t>	</a:t>
+            </a:r>
+            <a:r>
               <a:rPr lang="en-IN" dirty="0" smtClean="0"/>
-            </a:br>
+              <a:t>Python (Backend Framework – FLASK)</a:t>
+            </a:r>
             <a:endParaRPr lang="en-IN" dirty="0" smtClean="0"/>
           </a:p>
           <a:p>
@@ -16147,7 +16090,7 @@
         </p:blipFill>
         <p:spPr bwMode="auto">
           <a:xfrm>
-            <a:off x="3810000" y="1828800"/>
+            <a:off x="2660372" y="1841500"/>
             <a:ext cx="1524000" cy="2148839"/>
           </a:xfrm>
           <a:prstGeom prst="rect">
@@ -16186,8 +16129,8 @@
         </p:blipFill>
         <p:spPr bwMode="auto">
           <a:xfrm>
-            <a:off x="6173077" y="1752600"/>
-            <a:ext cx="2666123" cy="571638"/>
+            <a:off x="4419600" y="1676400"/>
+            <a:ext cx="2212670" cy="571638"/>
           </a:xfrm>
           <a:prstGeom prst="rect">
             <a:avLst/>
@@ -16225,7 +16168,7 @@
         </p:blipFill>
         <p:spPr bwMode="auto">
           <a:xfrm>
-            <a:off x="6467502" y="2220330"/>
+            <a:off x="4486302" y="2182599"/>
             <a:ext cx="2143098" cy="1818270"/>
           </a:xfrm>
           <a:prstGeom prst="rect">
@@ -16278,16 +16221,8 @@
               <a:rPr lang="en-IN" dirty="0" smtClean="0"/>
             </a:br>
             <a:r>
-              <a:rPr lang="en-IN" dirty="0" err="1" smtClean="0"/>
-              <a:t>HyperText</a:t>
-            </a:r>
-            <a:r>
               <a:rPr lang="en-IN" dirty="0" smtClean="0"/>
-              <a:t> </a:t>
-            </a:r>
-            <a:r>
-              <a:rPr lang="en-IN" dirty="0" err="1" smtClean="0"/>
-              <a:t>Markup</a:t>
+              <a:t>HyperText Markup</a:t>
             </a:r>
             <a:r>
               <a:rPr lang="en-IN" dirty="0"/>
@@ -16312,7 +16247,7 @@
         </p:nvSpPr>
         <p:spPr>
           <a:xfrm>
-            <a:off x="3884153" y="4114800"/>
+            <a:off x="2802046" y="4038600"/>
             <a:ext cx="1375698" cy="923330"/>
           </a:xfrm>
           <a:prstGeom prst="rect">
@@ -16361,7 +16296,7 @@
         </p:nvSpPr>
         <p:spPr>
           <a:xfrm>
-            <a:off x="6949282" y="4114800"/>
+            <a:off x="4953000" y="4102099"/>
             <a:ext cx="1184941" cy="646331"/>
           </a:xfrm>
           <a:prstGeom prst="rect">
@@ -16390,6 +16325,78 @@
             <a:r>
               <a:rPr lang="en-IN" dirty="0" smtClean="0"/>
               <a:t>JavaScript</a:t>
+            </a:r>
+            <a:endParaRPr lang="en-IN" dirty="0"/>
+          </a:p>
+        </p:txBody>
+      </p:sp>
+      <p:pic>
+        <p:nvPicPr>
+          <p:cNvPr id="2" name="Picture 1"/>
+          <p:cNvPicPr>
+            <a:picLocks noChangeAspect="1"/>
+          </p:cNvPicPr>
+          <p:nvPr/>
+        </p:nvPicPr>
+        <p:blipFill>
+          <a:blip r:embed="rId5" cstate="print">
+            <a:extLst>
+              <a:ext uri="{28A0092B-C50C-407E-A947-70E740481C1C}">
+                <a14:useLocalDpi xmlns:a14="http://schemas.microsoft.com/office/drawing/2010/main" val="0"/>
+              </a:ext>
+            </a:extLst>
+          </a:blip>
+          <a:stretch>
+            <a:fillRect/>
+          </a:stretch>
+        </p:blipFill>
+        <p:spPr>
+          <a:xfrm>
+            <a:off x="6731192" y="2248038"/>
+            <a:ext cx="1555405" cy="1741562"/>
+          </a:xfrm>
+          <a:prstGeom prst="rect">
+            <a:avLst/>
+          </a:prstGeom>
+        </p:spPr>
+      </p:pic>
+      <p:sp>
+        <p:nvSpPr>
+          <p:cNvPr id="13" name="TextBox 12"/>
+          <p:cNvSpPr txBox="1"/>
+          <p:nvPr/>
+        </p:nvSpPr>
+        <p:spPr>
+          <a:xfrm>
+            <a:off x="7112674" y="4078069"/>
+            <a:ext cx="744114" cy="646331"/>
+          </a:xfrm>
+          <a:prstGeom prst="rect">
+            <a:avLst/>
+          </a:prstGeom>
+          <a:noFill/>
+        </p:spPr>
+        <p:txBody>
+          <a:bodyPr wrap="none" rtlCol="0">
+            <a:spAutoFit/>
+          </a:bodyPr>
+          <a:lstStyle/>
+          <a:p>
+            <a:pPr algn="ctr"/>
+            <a:r>
+              <a:rPr lang="en-IN" b="1" dirty="0" smtClean="0"/>
+              <a:t>JS</a:t>
+            </a:r>
+            <a:r>
+              <a:rPr lang="en-IN" dirty="0" smtClean="0"/>
+              <a:t/>
+            </a:r>
+            <a:br>
+              <a:rPr lang="en-IN" dirty="0" smtClean="0"/>
+            </a:br>
+            <a:r>
+              <a:rPr lang="en-IN" dirty="0" smtClean="0"/>
+              <a:t>React</a:t>
             </a:r>
             <a:endParaRPr lang="en-IN" dirty="0"/>
           </a:p>
@@ -21919,7 +21926,14 @@
                 <a:latin typeface="Times New Roman" pitchFamily="18" charset="0"/>
                 <a:cs typeface="Times New Roman" pitchFamily="18" charset="0"/>
               </a:rPr>
-              <a:t>. : 1. prediction </a:t>
+              <a:t>. : 1. </a:t>
+            </a:r>
+            <a:r>
+              <a:rPr lang="en-US" sz="1600" dirty="0" smtClean="0">
+                <a:latin typeface="Times New Roman" pitchFamily="18" charset="0"/>
+                <a:cs typeface="Times New Roman" pitchFamily="18" charset="0"/>
+              </a:rPr>
+              <a:t>Prediction </a:t>
             </a:r>
             <a:r>
               <a:rPr lang="en-US" sz="1600" dirty="0">
@@ -21963,11 +21977,32 @@
               <a:t>        2. </a:t>
             </a:r>
             <a:r>
+              <a:rPr lang="en-US" sz="1600" dirty="0" smtClean="0">
+                <a:latin typeface="Times New Roman" pitchFamily="18" charset="0"/>
+                <a:cs typeface="Times New Roman" pitchFamily="18" charset="0"/>
+              </a:rPr>
+              <a:t>Prediction </a:t>
+            </a:r>
+            <a:r>
               <a:rPr lang="en-US" sz="1600" dirty="0">
                 <a:latin typeface="Times New Roman" pitchFamily="18" charset="0"/>
                 <a:cs typeface="Times New Roman" pitchFamily="18" charset="0"/>
               </a:rPr>
-              <a:t>prediction of House prices, etc</a:t>
+              <a:t>of House </a:t>
+            </a:r>
+            <a:r>
+              <a:rPr lang="en-US" sz="1600" dirty="0" smtClean="0">
+                <a:latin typeface="Times New Roman" pitchFamily="18" charset="0"/>
+                <a:cs typeface="Times New Roman" pitchFamily="18" charset="0"/>
+              </a:rPr>
+              <a:t>Prices</a:t>
+            </a:r>
+            <a:r>
+              <a:rPr lang="en-US" sz="1600" dirty="0">
+                <a:latin typeface="Times New Roman" pitchFamily="18" charset="0"/>
+                <a:cs typeface="Times New Roman" pitchFamily="18" charset="0"/>
+              </a:rPr>
+              <a:t>, etc</a:t>
             </a:r>
             <a:r>
               <a:rPr lang="en-US" sz="1600" dirty="0" smtClean="0">

</xml_diff>